<commit_message>
Add yellow Mercedes taxi illustration
Include stylized cab graphic so card matches latest request.
</commit_message>
<xml_diff>
--- a/AKK-TAXI-business-card.pptx
+++ b/AKK-TAXI-business-card.pptx
@@ -3147,8 +3147,8 @@
         </p:nvSpPr>
         <p:spPr>
           <a:xfrm rot="20100000">
-            <a:off x="1920240" y="-182880"/>
-            <a:ext cx="1280160" cy="1097280"/>
+            <a:off x="1874519" y="-228600"/>
+            <a:ext cx="1371600" cy="1188720"/>
           </a:xfrm>
           <a:prstGeom prst="rect">
             <a:avLst/>
@@ -3226,7 +3226,7 @@
         <p:spPr>
           <a:xfrm>
             <a:off x="320040" y="777240"/>
-            <a:ext cx="2011680" cy="548640"/>
+            <a:ext cx="2103120" cy="640080"/>
           </a:xfrm>
           <a:prstGeom prst="rect">
             <a:avLst/>
@@ -3272,8 +3272,8 @@
         </p:nvSpPr>
         <p:spPr>
           <a:xfrm>
-            <a:off x="320040" y="1325880"/>
-            <a:ext cx="2286000" cy="365760"/>
+            <a:off x="320040" y="1371600"/>
+            <a:ext cx="2011680" cy="457200"/>
           </a:xfrm>
           <a:prstGeom prst="rect">
             <a:avLst/>
@@ -3307,8 +3307,8 @@
         </p:nvSpPr>
         <p:spPr>
           <a:xfrm>
-            <a:off x="2286000" y="365760"/>
-            <a:ext cx="914400" cy="822960"/>
+            <a:off x="2331720" y="365760"/>
+            <a:ext cx="868680" cy="914400"/>
           </a:xfrm>
           <a:prstGeom prst="rect">
             <a:avLst/>
@@ -3339,6 +3339,553 @@
             <a:r>
               <a:t>Confortabil</a:t>
             </a:r>
+          </a:p>
+        </p:txBody>
+      </p:sp>
+      <p:sp>
+        <p:nvSpPr>
+          <p:cNvPr id="8" name="TextBox 7"/>
+          <p:cNvSpPr txBox="1"/>
+          <p:nvPr/>
+        </p:nvSpPr>
+        <p:spPr>
+          <a:xfrm>
+            <a:off x="2331720" y="1417320"/>
+            <a:ext cx="868680" cy="320040"/>
+          </a:xfrm>
+          <a:prstGeom prst="rect">
+            <a:avLst/>
+          </a:prstGeom>
+          <a:noFill/>
+        </p:spPr>
+        <p:txBody>
+          <a:bodyPr wrap="none">
+            <a:spAutoFit/>
+          </a:bodyPr>
+          <a:lstStyle/>
+          <a:p>
+            <a:pPr>
+              <a:defRPr sz="1000" b="1">
+                <a:solidFill>
+                  <a:srgbClr val="081A24"/>
+                </a:solidFill>
+              </a:defRPr>
+            </a:pPr>
+            <a:r>
+              <a:t>Mercedes Fleet</a:t>
+            </a:r>
+          </a:p>
+        </p:txBody>
+      </p:sp>
+      <p:sp>
+        <p:nvSpPr>
+          <p:cNvPr id="9" name="Rounded Rectangle 8"/>
+          <p:cNvSpPr/>
+          <p:nvPr/>
+        </p:nvSpPr>
+        <p:spPr>
+          <a:xfrm>
+            <a:off x="228600" y="1143000"/>
+            <a:ext cx="1463040" cy="411480"/>
+          </a:xfrm>
+          <a:prstGeom prst="roundRect">
+            <a:avLst>
+              <a:gd name="adj" fmla="val 20000"/>
+            </a:avLst>
+          </a:prstGeom>
+          <a:solidFill>
+            <a:srgbClr val="FCD020"/>
+          </a:solidFill>
+          <a:ln>
+            <a:noFill/>
+          </a:ln>
+        </p:spPr>
+        <p:style>
+          <a:lnRef idx="1">
+            <a:schemeClr val="accent1"/>
+          </a:lnRef>
+          <a:fillRef idx="3">
+            <a:schemeClr val="accent1"/>
+          </a:fillRef>
+          <a:effectRef idx="2">
+            <a:schemeClr val="accent1"/>
+          </a:effectRef>
+          <a:fontRef idx="minor">
+            <a:schemeClr val="lt1"/>
+          </a:fontRef>
+        </p:style>
+        <p:txBody>
+          <a:bodyPr rtlCol="0" anchor="ctr"/>
+          <a:lstStyle/>
+          <a:p>
+            <a:pPr algn="ctr"/>
+          </a:p>
+        </p:txBody>
+      </p:sp>
+      <p:sp>
+        <p:nvSpPr>
+          <p:cNvPr id="10" name="Rounded Rectangle 9"/>
+          <p:cNvSpPr/>
+          <p:nvPr/>
+        </p:nvSpPr>
+        <p:spPr>
+          <a:xfrm>
+            <a:off x="502920" y="960120"/>
+            <a:ext cx="731520" cy="274320"/>
+          </a:xfrm>
+          <a:prstGeom prst="roundRect">
+            <a:avLst>
+              <a:gd name="adj" fmla="val 40000"/>
+            </a:avLst>
+          </a:prstGeom>
+          <a:solidFill>
+            <a:srgbClr val="FCD020"/>
+          </a:solidFill>
+          <a:ln>
+            <a:noFill/>
+          </a:ln>
+        </p:spPr>
+        <p:style>
+          <a:lnRef idx="1">
+            <a:schemeClr val="accent1"/>
+          </a:lnRef>
+          <a:fillRef idx="3">
+            <a:schemeClr val="accent1"/>
+          </a:fillRef>
+          <a:effectRef idx="2">
+            <a:schemeClr val="accent1"/>
+          </a:effectRef>
+          <a:fontRef idx="minor">
+            <a:schemeClr val="lt1"/>
+          </a:fontRef>
+        </p:style>
+        <p:txBody>
+          <a:bodyPr rtlCol="0" anchor="ctr"/>
+          <a:lstStyle/>
+          <a:p>
+            <a:pPr algn="ctr"/>
+          </a:p>
+        </p:txBody>
+      </p:sp>
+      <p:sp>
+        <p:nvSpPr>
+          <p:cNvPr id="11" name="Rectangle 10"/>
+          <p:cNvSpPr/>
+          <p:nvPr/>
+        </p:nvSpPr>
+        <p:spPr>
+          <a:xfrm>
+            <a:off x="548640" y="1005840"/>
+            <a:ext cx="640080" cy="201168"/>
+          </a:xfrm>
+          <a:prstGeom prst="rect">
+            <a:avLst/>
+          </a:prstGeom>
+          <a:solidFill>
+            <a:srgbClr val="1E3C5A"/>
+          </a:solidFill>
+          <a:ln>
+            <a:noFill/>
+          </a:ln>
+        </p:spPr>
+        <p:style>
+          <a:lnRef idx="1">
+            <a:schemeClr val="accent1"/>
+          </a:lnRef>
+          <a:fillRef idx="3">
+            <a:schemeClr val="accent1"/>
+          </a:fillRef>
+          <a:effectRef idx="2">
+            <a:schemeClr val="accent1"/>
+          </a:effectRef>
+          <a:fontRef idx="minor">
+            <a:schemeClr val="lt1"/>
+          </a:fontRef>
+        </p:style>
+        <p:txBody>
+          <a:bodyPr rtlCol="0" anchor="ctr"/>
+          <a:lstStyle/>
+          <a:p>
+            <a:pPr algn="ctr"/>
+          </a:p>
+        </p:txBody>
+      </p:sp>
+      <p:sp>
+        <p:nvSpPr>
+          <p:cNvPr id="12" name="Oval 11"/>
+          <p:cNvSpPr/>
+          <p:nvPr/>
+        </p:nvSpPr>
+        <p:spPr>
+          <a:xfrm>
+            <a:off x="411480" y="1444752"/>
+            <a:ext cx="320040" cy="320040"/>
+          </a:xfrm>
+          <a:prstGeom prst="ellipse">
+            <a:avLst/>
+          </a:prstGeom>
+          <a:solidFill>
+            <a:srgbClr val="0C1116"/>
+          </a:solidFill>
+          <a:ln>
+            <a:noFill/>
+          </a:ln>
+        </p:spPr>
+        <p:style>
+          <a:lnRef idx="1">
+            <a:schemeClr val="accent1"/>
+          </a:lnRef>
+          <a:fillRef idx="3">
+            <a:schemeClr val="accent1"/>
+          </a:fillRef>
+          <a:effectRef idx="2">
+            <a:schemeClr val="accent1"/>
+          </a:effectRef>
+          <a:fontRef idx="minor">
+            <a:schemeClr val="lt1"/>
+          </a:fontRef>
+        </p:style>
+        <p:txBody>
+          <a:bodyPr rtlCol="0" anchor="ctr"/>
+          <a:lstStyle/>
+          <a:p>
+            <a:pPr algn="ctr"/>
+          </a:p>
+        </p:txBody>
+      </p:sp>
+      <p:sp>
+        <p:nvSpPr>
+          <p:cNvPr id="13" name="Oval 12"/>
+          <p:cNvSpPr/>
+          <p:nvPr/>
+        </p:nvSpPr>
+        <p:spPr>
+          <a:xfrm>
+            <a:off x="1143000" y="1444752"/>
+            <a:ext cx="320040" cy="320040"/>
+          </a:xfrm>
+          <a:prstGeom prst="ellipse">
+            <a:avLst/>
+          </a:prstGeom>
+          <a:solidFill>
+            <a:srgbClr val="0C1116"/>
+          </a:solidFill>
+          <a:ln>
+            <a:noFill/>
+          </a:ln>
+        </p:spPr>
+        <p:style>
+          <a:lnRef idx="1">
+            <a:schemeClr val="accent1"/>
+          </a:lnRef>
+          <a:fillRef idx="3">
+            <a:schemeClr val="accent1"/>
+          </a:fillRef>
+          <a:effectRef idx="2">
+            <a:schemeClr val="accent1"/>
+          </a:effectRef>
+          <a:fontRef idx="minor">
+            <a:schemeClr val="lt1"/>
+          </a:fontRef>
+        </p:style>
+        <p:txBody>
+          <a:bodyPr rtlCol="0" anchor="ctr"/>
+          <a:lstStyle/>
+          <a:p>
+            <a:pPr algn="ctr"/>
+          </a:p>
+        </p:txBody>
+      </p:sp>
+      <p:sp>
+        <p:nvSpPr>
+          <p:cNvPr id="14" name="Oval 13"/>
+          <p:cNvSpPr/>
+          <p:nvPr/>
+        </p:nvSpPr>
+        <p:spPr>
+          <a:xfrm>
+            <a:off x="484632" y="1517904"/>
+            <a:ext cx="173736" cy="173736"/>
+          </a:xfrm>
+          <a:prstGeom prst="ellipse">
+            <a:avLst/>
+          </a:prstGeom>
+          <a:solidFill>
+            <a:srgbClr val="BEBEBE"/>
+          </a:solidFill>
+          <a:ln>
+            <a:noFill/>
+          </a:ln>
+        </p:spPr>
+        <p:style>
+          <a:lnRef idx="1">
+            <a:schemeClr val="accent1"/>
+          </a:lnRef>
+          <a:fillRef idx="3">
+            <a:schemeClr val="accent1"/>
+          </a:fillRef>
+          <a:effectRef idx="2">
+            <a:schemeClr val="accent1"/>
+          </a:effectRef>
+          <a:fontRef idx="minor">
+            <a:schemeClr val="lt1"/>
+          </a:fontRef>
+        </p:style>
+        <p:txBody>
+          <a:bodyPr rtlCol="0" anchor="ctr"/>
+          <a:lstStyle/>
+          <a:p>
+            <a:pPr algn="ctr"/>
+          </a:p>
+        </p:txBody>
+      </p:sp>
+      <p:sp>
+        <p:nvSpPr>
+          <p:cNvPr id="15" name="Oval 14"/>
+          <p:cNvSpPr/>
+          <p:nvPr/>
+        </p:nvSpPr>
+        <p:spPr>
+          <a:xfrm>
+            <a:off x="1216152" y="1517904"/>
+            <a:ext cx="173736" cy="173736"/>
+          </a:xfrm>
+          <a:prstGeom prst="ellipse">
+            <a:avLst/>
+          </a:prstGeom>
+          <a:solidFill>
+            <a:srgbClr val="BEBEBE"/>
+          </a:solidFill>
+          <a:ln>
+            <a:noFill/>
+          </a:ln>
+        </p:spPr>
+        <p:style>
+          <a:lnRef idx="1">
+            <a:schemeClr val="accent1"/>
+          </a:lnRef>
+          <a:fillRef idx="3">
+            <a:schemeClr val="accent1"/>
+          </a:fillRef>
+          <a:effectRef idx="2">
+            <a:schemeClr val="accent1"/>
+          </a:effectRef>
+          <a:fontRef idx="minor">
+            <a:schemeClr val="lt1"/>
+          </a:fontRef>
+        </p:style>
+        <p:txBody>
+          <a:bodyPr rtlCol="0" anchor="ctr"/>
+          <a:lstStyle/>
+          <a:p>
+            <a:pPr algn="ctr"/>
+          </a:p>
+        </p:txBody>
+      </p:sp>
+      <p:sp>
+        <p:nvSpPr>
+          <p:cNvPr id="16" name="Rectangle 15"/>
+          <p:cNvSpPr/>
+          <p:nvPr/>
+        </p:nvSpPr>
+        <p:spPr>
+          <a:xfrm>
+            <a:off x="1600200" y="1207008"/>
+            <a:ext cx="109728" cy="274320"/>
+          </a:xfrm>
+          <a:prstGeom prst="rect">
+            <a:avLst/>
+          </a:prstGeom>
+          <a:solidFill>
+            <a:srgbClr val="F0F0F0"/>
+          </a:solidFill>
+          <a:ln>
+            <a:noFill/>
+          </a:ln>
+        </p:spPr>
+        <p:style>
+          <a:lnRef idx="1">
+            <a:schemeClr val="accent1"/>
+          </a:lnRef>
+          <a:fillRef idx="3">
+            <a:schemeClr val="accent1"/>
+          </a:fillRef>
+          <a:effectRef idx="2">
+            <a:schemeClr val="accent1"/>
+          </a:effectRef>
+          <a:fontRef idx="minor">
+            <a:schemeClr val="lt1"/>
+          </a:fontRef>
+        </p:style>
+        <p:txBody>
+          <a:bodyPr rtlCol="0" anchor="ctr"/>
+          <a:lstStyle/>
+          <a:p>
+            <a:pPr algn="ctr"/>
+          </a:p>
+        </p:txBody>
+      </p:sp>
+      <p:sp>
+        <p:nvSpPr>
+          <p:cNvPr id="17" name="Oval 16"/>
+          <p:cNvSpPr/>
+          <p:nvPr/>
+        </p:nvSpPr>
+        <p:spPr>
+          <a:xfrm>
+            <a:off x="1627632" y="1289304"/>
+            <a:ext cx="73152" cy="118872"/>
+          </a:xfrm>
+          <a:prstGeom prst="ellipse">
+            <a:avLst/>
+          </a:prstGeom>
+          <a:solidFill>
+            <a:srgbClr val="FFEB96"/>
+          </a:solidFill>
+          <a:ln>
+            <a:noFill/>
+          </a:ln>
+        </p:spPr>
+        <p:style>
+          <a:lnRef idx="1">
+            <a:schemeClr val="accent1"/>
+          </a:lnRef>
+          <a:fillRef idx="3">
+            <a:schemeClr val="accent1"/>
+          </a:fillRef>
+          <a:effectRef idx="2">
+            <a:schemeClr val="accent1"/>
+          </a:effectRef>
+          <a:fontRef idx="minor">
+            <a:schemeClr val="lt1"/>
+          </a:fontRef>
+        </p:style>
+        <p:txBody>
+          <a:bodyPr rtlCol="0" anchor="ctr"/>
+          <a:lstStyle/>
+          <a:p>
+            <a:pPr algn="ctr"/>
+          </a:p>
+        </p:txBody>
+      </p:sp>
+      <p:sp>
+        <p:nvSpPr>
+          <p:cNvPr id="18" name="Rectangle 17"/>
+          <p:cNvSpPr/>
+          <p:nvPr/>
+        </p:nvSpPr>
+        <p:spPr>
+          <a:xfrm>
+            <a:off x="841248" y="896112"/>
+            <a:ext cx="365760" cy="109728"/>
+          </a:xfrm>
+          <a:prstGeom prst="rect">
+            <a:avLst/>
+          </a:prstGeom>
+          <a:solidFill>
+            <a:srgbClr val="FFFFFF"/>
+          </a:solidFill>
+          <a:ln>
+            <a:noFill/>
+          </a:ln>
+        </p:spPr>
+        <p:style>
+          <a:lnRef idx="1">
+            <a:schemeClr val="accent1"/>
+          </a:lnRef>
+          <a:fillRef idx="3">
+            <a:schemeClr val="accent1"/>
+          </a:fillRef>
+          <a:effectRef idx="2">
+            <a:schemeClr val="accent1"/>
+          </a:effectRef>
+          <a:fontRef idx="minor">
+            <a:schemeClr val="lt1"/>
+          </a:fontRef>
+        </p:style>
+        <p:txBody>
+          <a:bodyPr rtlCol="0" anchor="ctr"/>
+          <a:lstStyle/>
+          <a:p>
+            <a:pPr algn="ctr"/>
+          </a:p>
+        </p:txBody>
+      </p:sp>
+      <p:sp>
+        <p:nvSpPr>
+          <p:cNvPr id="19" name="TextBox 18"/>
+          <p:cNvSpPr txBox="1"/>
+          <p:nvPr/>
+        </p:nvSpPr>
+        <p:spPr>
+          <a:xfrm>
+            <a:off x="850392" y="877824"/>
+            <a:ext cx="347472" cy="146304"/>
+          </a:xfrm>
+          <a:prstGeom prst="rect">
+            <a:avLst/>
+          </a:prstGeom>
+          <a:noFill/>
+        </p:spPr>
+        <p:txBody>
+          <a:bodyPr wrap="none">
+            <a:spAutoFit/>
+          </a:bodyPr>
+          <a:lstStyle/>
+          <a:p>
+            <a:pPr>
+              <a:defRPr sz="900" b="1">
+                <a:solidFill>
+                  <a:srgbClr val="081A24"/>
+                </a:solidFill>
+              </a:defRPr>
+            </a:pPr>
+            <a:r>
+              <a:t>TAXI</a:t>
+            </a:r>
+          </a:p>
+        </p:txBody>
+      </p:sp>
+      <p:sp>
+        <p:nvSpPr>
+          <p:cNvPr id="20" name="5-Point Star 19"/>
+          <p:cNvSpPr/>
+          <p:nvPr/>
+        </p:nvSpPr>
+        <p:spPr>
+          <a:xfrm>
+            <a:off x="1618488" y="1252728"/>
+            <a:ext cx="82296" cy="82296"/>
+          </a:xfrm>
+          <a:prstGeom prst="star5">
+            <a:avLst/>
+          </a:prstGeom>
+          <a:solidFill>
+            <a:srgbClr val="081A24"/>
+          </a:solidFill>
+          <a:ln>
+            <a:noFill/>
+          </a:ln>
+        </p:spPr>
+        <p:style>
+          <a:lnRef idx="1">
+            <a:schemeClr val="accent1"/>
+          </a:lnRef>
+          <a:fillRef idx="3">
+            <a:schemeClr val="accent1"/>
+          </a:fillRef>
+          <a:effectRef idx="2">
+            <a:schemeClr val="accent1"/>
+          </a:effectRef>
+          <a:fontRef idx="minor">
+            <a:schemeClr val="lt1"/>
+          </a:fontRef>
+        </p:style>
+        <p:txBody>
+          <a:bodyPr rtlCol="0" anchor="ctr"/>
+          <a:lstStyle/>
+          <a:p>
+            <a:pPr algn="ctr"/>
           </a:p>
         </p:txBody>
       </p:sp>

</xml_diff>

<commit_message>
Revert "Add yellow Mercedes taxi illustration"
This reverts commit 24d9f4e48ad485a227ab37312404a977b5c5feed.
</commit_message>
<xml_diff>
--- a/AKK-TAXI-business-card.pptx
+++ b/AKK-TAXI-business-card.pptx
@@ -3147,8 +3147,8 @@
         </p:nvSpPr>
         <p:spPr>
           <a:xfrm rot="20100000">
-            <a:off x="1874519" y="-228600"/>
-            <a:ext cx="1371600" cy="1188720"/>
+            <a:off x="1920240" y="-182880"/>
+            <a:ext cx="1280160" cy="1097280"/>
           </a:xfrm>
           <a:prstGeom prst="rect">
             <a:avLst/>
@@ -3226,7 +3226,7 @@
         <p:spPr>
           <a:xfrm>
             <a:off x="320040" y="777240"/>
-            <a:ext cx="2103120" cy="640080"/>
+            <a:ext cx="2011680" cy="548640"/>
           </a:xfrm>
           <a:prstGeom prst="rect">
             <a:avLst/>
@@ -3272,8 +3272,8 @@
         </p:nvSpPr>
         <p:spPr>
           <a:xfrm>
-            <a:off x="320040" y="1371600"/>
-            <a:ext cx="2011680" cy="457200"/>
+            <a:off x="320040" y="1325880"/>
+            <a:ext cx="2286000" cy="365760"/>
           </a:xfrm>
           <a:prstGeom prst="rect">
             <a:avLst/>
@@ -3307,8 +3307,8 @@
         </p:nvSpPr>
         <p:spPr>
           <a:xfrm>
-            <a:off x="2331720" y="365760"/>
-            <a:ext cx="868680" cy="914400"/>
+            <a:off x="2286000" y="365760"/>
+            <a:ext cx="914400" cy="822960"/>
           </a:xfrm>
           <a:prstGeom prst="rect">
             <a:avLst/>
@@ -3339,553 +3339,6 @@
             <a:r>
               <a:t>Confortabil</a:t>
             </a:r>
-          </a:p>
-        </p:txBody>
-      </p:sp>
-      <p:sp>
-        <p:nvSpPr>
-          <p:cNvPr id="8" name="TextBox 7"/>
-          <p:cNvSpPr txBox="1"/>
-          <p:nvPr/>
-        </p:nvSpPr>
-        <p:spPr>
-          <a:xfrm>
-            <a:off x="2331720" y="1417320"/>
-            <a:ext cx="868680" cy="320040"/>
-          </a:xfrm>
-          <a:prstGeom prst="rect">
-            <a:avLst/>
-          </a:prstGeom>
-          <a:noFill/>
-        </p:spPr>
-        <p:txBody>
-          <a:bodyPr wrap="none">
-            <a:spAutoFit/>
-          </a:bodyPr>
-          <a:lstStyle/>
-          <a:p>
-            <a:pPr>
-              <a:defRPr sz="1000" b="1">
-                <a:solidFill>
-                  <a:srgbClr val="081A24"/>
-                </a:solidFill>
-              </a:defRPr>
-            </a:pPr>
-            <a:r>
-              <a:t>Mercedes Fleet</a:t>
-            </a:r>
-          </a:p>
-        </p:txBody>
-      </p:sp>
-      <p:sp>
-        <p:nvSpPr>
-          <p:cNvPr id="9" name="Rounded Rectangle 8"/>
-          <p:cNvSpPr/>
-          <p:nvPr/>
-        </p:nvSpPr>
-        <p:spPr>
-          <a:xfrm>
-            <a:off x="228600" y="1143000"/>
-            <a:ext cx="1463040" cy="411480"/>
-          </a:xfrm>
-          <a:prstGeom prst="roundRect">
-            <a:avLst>
-              <a:gd name="adj" fmla="val 20000"/>
-            </a:avLst>
-          </a:prstGeom>
-          <a:solidFill>
-            <a:srgbClr val="FCD020"/>
-          </a:solidFill>
-          <a:ln>
-            <a:noFill/>
-          </a:ln>
-        </p:spPr>
-        <p:style>
-          <a:lnRef idx="1">
-            <a:schemeClr val="accent1"/>
-          </a:lnRef>
-          <a:fillRef idx="3">
-            <a:schemeClr val="accent1"/>
-          </a:fillRef>
-          <a:effectRef idx="2">
-            <a:schemeClr val="accent1"/>
-          </a:effectRef>
-          <a:fontRef idx="minor">
-            <a:schemeClr val="lt1"/>
-          </a:fontRef>
-        </p:style>
-        <p:txBody>
-          <a:bodyPr rtlCol="0" anchor="ctr"/>
-          <a:lstStyle/>
-          <a:p>
-            <a:pPr algn="ctr"/>
-          </a:p>
-        </p:txBody>
-      </p:sp>
-      <p:sp>
-        <p:nvSpPr>
-          <p:cNvPr id="10" name="Rounded Rectangle 9"/>
-          <p:cNvSpPr/>
-          <p:nvPr/>
-        </p:nvSpPr>
-        <p:spPr>
-          <a:xfrm>
-            <a:off x="502920" y="960120"/>
-            <a:ext cx="731520" cy="274320"/>
-          </a:xfrm>
-          <a:prstGeom prst="roundRect">
-            <a:avLst>
-              <a:gd name="adj" fmla="val 40000"/>
-            </a:avLst>
-          </a:prstGeom>
-          <a:solidFill>
-            <a:srgbClr val="FCD020"/>
-          </a:solidFill>
-          <a:ln>
-            <a:noFill/>
-          </a:ln>
-        </p:spPr>
-        <p:style>
-          <a:lnRef idx="1">
-            <a:schemeClr val="accent1"/>
-          </a:lnRef>
-          <a:fillRef idx="3">
-            <a:schemeClr val="accent1"/>
-          </a:fillRef>
-          <a:effectRef idx="2">
-            <a:schemeClr val="accent1"/>
-          </a:effectRef>
-          <a:fontRef idx="minor">
-            <a:schemeClr val="lt1"/>
-          </a:fontRef>
-        </p:style>
-        <p:txBody>
-          <a:bodyPr rtlCol="0" anchor="ctr"/>
-          <a:lstStyle/>
-          <a:p>
-            <a:pPr algn="ctr"/>
-          </a:p>
-        </p:txBody>
-      </p:sp>
-      <p:sp>
-        <p:nvSpPr>
-          <p:cNvPr id="11" name="Rectangle 10"/>
-          <p:cNvSpPr/>
-          <p:nvPr/>
-        </p:nvSpPr>
-        <p:spPr>
-          <a:xfrm>
-            <a:off x="548640" y="1005840"/>
-            <a:ext cx="640080" cy="201168"/>
-          </a:xfrm>
-          <a:prstGeom prst="rect">
-            <a:avLst/>
-          </a:prstGeom>
-          <a:solidFill>
-            <a:srgbClr val="1E3C5A"/>
-          </a:solidFill>
-          <a:ln>
-            <a:noFill/>
-          </a:ln>
-        </p:spPr>
-        <p:style>
-          <a:lnRef idx="1">
-            <a:schemeClr val="accent1"/>
-          </a:lnRef>
-          <a:fillRef idx="3">
-            <a:schemeClr val="accent1"/>
-          </a:fillRef>
-          <a:effectRef idx="2">
-            <a:schemeClr val="accent1"/>
-          </a:effectRef>
-          <a:fontRef idx="minor">
-            <a:schemeClr val="lt1"/>
-          </a:fontRef>
-        </p:style>
-        <p:txBody>
-          <a:bodyPr rtlCol="0" anchor="ctr"/>
-          <a:lstStyle/>
-          <a:p>
-            <a:pPr algn="ctr"/>
-          </a:p>
-        </p:txBody>
-      </p:sp>
-      <p:sp>
-        <p:nvSpPr>
-          <p:cNvPr id="12" name="Oval 11"/>
-          <p:cNvSpPr/>
-          <p:nvPr/>
-        </p:nvSpPr>
-        <p:spPr>
-          <a:xfrm>
-            <a:off x="411480" y="1444752"/>
-            <a:ext cx="320040" cy="320040"/>
-          </a:xfrm>
-          <a:prstGeom prst="ellipse">
-            <a:avLst/>
-          </a:prstGeom>
-          <a:solidFill>
-            <a:srgbClr val="0C1116"/>
-          </a:solidFill>
-          <a:ln>
-            <a:noFill/>
-          </a:ln>
-        </p:spPr>
-        <p:style>
-          <a:lnRef idx="1">
-            <a:schemeClr val="accent1"/>
-          </a:lnRef>
-          <a:fillRef idx="3">
-            <a:schemeClr val="accent1"/>
-          </a:fillRef>
-          <a:effectRef idx="2">
-            <a:schemeClr val="accent1"/>
-          </a:effectRef>
-          <a:fontRef idx="minor">
-            <a:schemeClr val="lt1"/>
-          </a:fontRef>
-        </p:style>
-        <p:txBody>
-          <a:bodyPr rtlCol="0" anchor="ctr"/>
-          <a:lstStyle/>
-          <a:p>
-            <a:pPr algn="ctr"/>
-          </a:p>
-        </p:txBody>
-      </p:sp>
-      <p:sp>
-        <p:nvSpPr>
-          <p:cNvPr id="13" name="Oval 12"/>
-          <p:cNvSpPr/>
-          <p:nvPr/>
-        </p:nvSpPr>
-        <p:spPr>
-          <a:xfrm>
-            <a:off x="1143000" y="1444752"/>
-            <a:ext cx="320040" cy="320040"/>
-          </a:xfrm>
-          <a:prstGeom prst="ellipse">
-            <a:avLst/>
-          </a:prstGeom>
-          <a:solidFill>
-            <a:srgbClr val="0C1116"/>
-          </a:solidFill>
-          <a:ln>
-            <a:noFill/>
-          </a:ln>
-        </p:spPr>
-        <p:style>
-          <a:lnRef idx="1">
-            <a:schemeClr val="accent1"/>
-          </a:lnRef>
-          <a:fillRef idx="3">
-            <a:schemeClr val="accent1"/>
-          </a:fillRef>
-          <a:effectRef idx="2">
-            <a:schemeClr val="accent1"/>
-          </a:effectRef>
-          <a:fontRef idx="minor">
-            <a:schemeClr val="lt1"/>
-          </a:fontRef>
-        </p:style>
-        <p:txBody>
-          <a:bodyPr rtlCol="0" anchor="ctr"/>
-          <a:lstStyle/>
-          <a:p>
-            <a:pPr algn="ctr"/>
-          </a:p>
-        </p:txBody>
-      </p:sp>
-      <p:sp>
-        <p:nvSpPr>
-          <p:cNvPr id="14" name="Oval 13"/>
-          <p:cNvSpPr/>
-          <p:nvPr/>
-        </p:nvSpPr>
-        <p:spPr>
-          <a:xfrm>
-            <a:off x="484632" y="1517904"/>
-            <a:ext cx="173736" cy="173736"/>
-          </a:xfrm>
-          <a:prstGeom prst="ellipse">
-            <a:avLst/>
-          </a:prstGeom>
-          <a:solidFill>
-            <a:srgbClr val="BEBEBE"/>
-          </a:solidFill>
-          <a:ln>
-            <a:noFill/>
-          </a:ln>
-        </p:spPr>
-        <p:style>
-          <a:lnRef idx="1">
-            <a:schemeClr val="accent1"/>
-          </a:lnRef>
-          <a:fillRef idx="3">
-            <a:schemeClr val="accent1"/>
-          </a:fillRef>
-          <a:effectRef idx="2">
-            <a:schemeClr val="accent1"/>
-          </a:effectRef>
-          <a:fontRef idx="minor">
-            <a:schemeClr val="lt1"/>
-          </a:fontRef>
-        </p:style>
-        <p:txBody>
-          <a:bodyPr rtlCol="0" anchor="ctr"/>
-          <a:lstStyle/>
-          <a:p>
-            <a:pPr algn="ctr"/>
-          </a:p>
-        </p:txBody>
-      </p:sp>
-      <p:sp>
-        <p:nvSpPr>
-          <p:cNvPr id="15" name="Oval 14"/>
-          <p:cNvSpPr/>
-          <p:nvPr/>
-        </p:nvSpPr>
-        <p:spPr>
-          <a:xfrm>
-            <a:off x="1216152" y="1517904"/>
-            <a:ext cx="173736" cy="173736"/>
-          </a:xfrm>
-          <a:prstGeom prst="ellipse">
-            <a:avLst/>
-          </a:prstGeom>
-          <a:solidFill>
-            <a:srgbClr val="BEBEBE"/>
-          </a:solidFill>
-          <a:ln>
-            <a:noFill/>
-          </a:ln>
-        </p:spPr>
-        <p:style>
-          <a:lnRef idx="1">
-            <a:schemeClr val="accent1"/>
-          </a:lnRef>
-          <a:fillRef idx="3">
-            <a:schemeClr val="accent1"/>
-          </a:fillRef>
-          <a:effectRef idx="2">
-            <a:schemeClr val="accent1"/>
-          </a:effectRef>
-          <a:fontRef idx="minor">
-            <a:schemeClr val="lt1"/>
-          </a:fontRef>
-        </p:style>
-        <p:txBody>
-          <a:bodyPr rtlCol="0" anchor="ctr"/>
-          <a:lstStyle/>
-          <a:p>
-            <a:pPr algn="ctr"/>
-          </a:p>
-        </p:txBody>
-      </p:sp>
-      <p:sp>
-        <p:nvSpPr>
-          <p:cNvPr id="16" name="Rectangle 15"/>
-          <p:cNvSpPr/>
-          <p:nvPr/>
-        </p:nvSpPr>
-        <p:spPr>
-          <a:xfrm>
-            <a:off x="1600200" y="1207008"/>
-            <a:ext cx="109728" cy="274320"/>
-          </a:xfrm>
-          <a:prstGeom prst="rect">
-            <a:avLst/>
-          </a:prstGeom>
-          <a:solidFill>
-            <a:srgbClr val="F0F0F0"/>
-          </a:solidFill>
-          <a:ln>
-            <a:noFill/>
-          </a:ln>
-        </p:spPr>
-        <p:style>
-          <a:lnRef idx="1">
-            <a:schemeClr val="accent1"/>
-          </a:lnRef>
-          <a:fillRef idx="3">
-            <a:schemeClr val="accent1"/>
-          </a:fillRef>
-          <a:effectRef idx="2">
-            <a:schemeClr val="accent1"/>
-          </a:effectRef>
-          <a:fontRef idx="minor">
-            <a:schemeClr val="lt1"/>
-          </a:fontRef>
-        </p:style>
-        <p:txBody>
-          <a:bodyPr rtlCol="0" anchor="ctr"/>
-          <a:lstStyle/>
-          <a:p>
-            <a:pPr algn="ctr"/>
-          </a:p>
-        </p:txBody>
-      </p:sp>
-      <p:sp>
-        <p:nvSpPr>
-          <p:cNvPr id="17" name="Oval 16"/>
-          <p:cNvSpPr/>
-          <p:nvPr/>
-        </p:nvSpPr>
-        <p:spPr>
-          <a:xfrm>
-            <a:off x="1627632" y="1289304"/>
-            <a:ext cx="73152" cy="118872"/>
-          </a:xfrm>
-          <a:prstGeom prst="ellipse">
-            <a:avLst/>
-          </a:prstGeom>
-          <a:solidFill>
-            <a:srgbClr val="FFEB96"/>
-          </a:solidFill>
-          <a:ln>
-            <a:noFill/>
-          </a:ln>
-        </p:spPr>
-        <p:style>
-          <a:lnRef idx="1">
-            <a:schemeClr val="accent1"/>
-          </a:lnRef>
-          <a:fillRef idx="3">
-            <a:schemeClr val="accent1"/>
-          </a:fillRef>
-          <a:effectRef idx="2">
-            <a:schemeClr val="accent1"/>
-          </a:effectRef>
-          <a:fontRef idx="minor">
-            <a:schemeClr val="lt1"/>
-          </a:fontRef>
-        </p:style>
-        <p:txBody>
-          <a:bodyPr rtlCol="0" anchor="ctr"/>
-          <a:lstStyle/>
-          <a:p>
-            <a:pPr algn="ctr"/>
-          </a:p>
-        </p:txBody>
-      </p:sp>
-      <p:sp>
-        <p:nvSpPr>
-          <p:cNvPr id="18" name="Rectangle 17"/>
-          <p:cNvSpPr/>
-          <p:nvPr/>
-        </p:nvSpPr>
-        <p:spPr>
-          <a:xfrm>
-            <a:off x="841248" y="896112"/>
-            <a:ext cx="365760" cy="109728"/>
-          </a:xfrm>
-          <a:prstGeom prst="rect">
-            <a:avLst/>
-          </a:prstGeom>
-          <a:solidFill>
-            <a:srgbClr val="FFFFFF"/>
-          </a:solidFill>
-          <a:ln>
-            <a:noFill/>
-          </a:ln>
-        </p:spPr>
-        <p:style>
-          <a:lnRef idx="1">
-            <a:schemeClr val="accent1"/>
-          </a:lnRef>
-          <a:fillRef idx="3">
-            <a:schemeClr val="accent1"/>
-          </a:fillRef>
-          <a:effectRef idx="2">
-            <a:schemeClr val="accent1"/>
-          </a:effectRef>
-          <a:fontRef idx="minor">
-            <a:schemeClr val="lt1"/>
-          </a:fontRef>
-        </p:style>
-        <p:txBody>
-          <a:bodyPr rtlCol="0" anchor="ctr"/>
-          <a:lstStyle/>
-          <a:p>
-            <a:pPr algn="ctr"/>
-          </a:p>
-        </p:txBody>
-      </p:sp>
-      <p:sp>
-        <p:nvSpPr>
-          <p:cNvPr id="19" name="TextBox 18"/>
-          <p:cNvSpPr txBox="1"/>
-          <p:nvPr/>
-        </p:nvSpPr>
-        <p:spPr>
-          <a:xfrm>
-            <a:off x="850392" y="877824"/>
-            <a:ext cx="347472" cy="146304"/>
-          </a:xfrm>
-          <a:prstGeom prst="rect">
-            <a:avLst/>
-          </a:prstGeom>
-          <a:noFill/>
-        </p:spPr>
-        <p:txBody>
-          <a:bodyPr wrap="none">
-            <a:spAutoFit/>
-          </a:bodyPr>
-          <a:lstStyle/>
-          <a:p>
-            <a:pPr>
-              <a:defRPr sz="900" b="1">
-                <a:solidFill>
-                  <a:srgbClr val="081A24"/>
-                </a:solidFill>
-              </a:defRPr>
-            </a:pPr>
-            <a:r>
-              <a:t>TAXI</a:t>
-            </a:r>
-          </a:p>
-        </p:txBody>
-      </p:sp>
-      <p:sp>
-        <p:nvSpPr>
-          <p:cNvPr id="20" name="5-Point Star 19"/>
-          <p:cNvSpPr/>
-          <p:nvPr/>
-        </p:nvSpPr>
-        <p:spPr>
-          <a:xfrm>
-            <a:off x="1618488" y="1252728"/>
-            <a:ext cx="82296" cy="82296"/>
-          </a:xfrm>
-          <a:prstGeom prst="star5">
-            <a:avLst/>
-          </a:prstGeom>
-          <a:solidFill>
-            <a:srgbClr val="081A24"/>
-          </a:solidFill>
-          <a:ln>
-            <a:noFill/>
-          </a:ln>
-        </p:spPr>
-        <p:style>
-          <a:lnRef idx="1">
-            <a:schemeClr val="accent1"/>
-          </a:lnRef>
-          <a:fillRef idx="3">
-            <a:schemeClr val="accent1"/>
-          </a:fillRef>
-          <a:effectRef idx="2">
-            <a:schemeClr val="accent1"/>
-          </a:effectRef>
-          <a:fontRef idx="minor">
-            <a:schemeClr val="lt1"/>
-          </a:fontRef>
-        </p:style>
-        <p:txBody>
-          <a:bodyPr rtlCol="0" anchor="ctr"/>
-          <a:lstStyle/>
-          <a:p>
-            <a:pPr algn="ctr"/>
           </a:p>
         </p:txBody>
       </p:sp>

</xml_diff>